<commit_message>
update pptx slides to reduce video lengths
</commit_message>
<xml_diff>
--- a/lessons/A_Setup_Intro_Basics/Day1_vid6.pptx
+++ b/lessons/A_Setup_Intro_Basics/Day1_vid6.pptx
@@ -20903,7 +20903,15 @@
             </a:pPr>
             <a:r>
               <a:rPr lang="en-US" dirty="0"/>
-              <a:t>Due Day2 Before Class!</a:t>
+              <a:t>Due </a:t>
+            </a:r>
+            <a:r>
+              <a:rPr lang="en-US" b="1" u="sng" dirty="0"/>
+              <a:t>WEDS</a:t>
+            </a:r>
+            <a:r>
+              <a:rPr lang="en-US" dirty="0"/>
+              <a:t> Before Class!</a:t>
             </a:r>
           </a:p>
           <a:p>
@@ -21011,6 +21019,55 @@
           </a:fontRef>
         </p:style>
       </p:cxnSp>
+      <p:sp>
+        <p:nvSpPr>
+          <p:cNvPr id="9" name="Rectangle 8">
+            <a:extLst>
+              <a:ext uri="{FF2B5EF4-FFF2-40B4-BE49-F238E27FC236}">
+                <a16:creationId xmlns:a16="http://schemas.microsoft.com/office/drawing/2014/main" id="{ABEDA3B8-13AE-E64D-8AD5-71727B76BE5F}"/>
+              </a:ext>
+            </a:extLst>
+          </p:cNvPr>
+          <p:cNvSpPr/>
+          <p:nvPr/>
+        </p:nvSpPr>
+        <p:spPr>
+          <a:xfrm>
+            <a:off x="890650" y="4001984"/>
+            <a:ext cx="7362701" cy="676894"/>
+          </a:xfrm>
+          <a:prstGeom prst="rect">
+            <a:avLst/>
+          </a:prstGeom>
+        </p:spPr>
+        <p:style>
+          <a:lnRef idx="2">
+            <a:schemeClr val="accent1">
+              <a:shade val="50000"/>
+            </a:schemeClr>
+          </a:lnRef>
+          <a:fillRef idx="1">
+            <a:schemeClr val="accent1"/>
+          </a:fillRef>
+          <a:effectRef idx="0">
+            <a:schemeClr val="accent1"/>
+          </a:effectRef>
+          <a:fontRef idx="minor">
+            <a:schemeClr val="lt1"/>
+          </a:fontRef>
+        </p:style>
+        <p:txBody>
+          <a:bodyPr rtlCol="0" anchor="ctr"/>
+          <a:lstStyle/>
+          <a:p>
+            <a:pPr algn="ctr"/>
+            <a:r>
+              <a:rPr lang="en-US" dirty="0"/>
+              <a:t>Added another day because I underestimated the time it takes to upload large video files so the videos were delayed by a few hours!</a:t>
+            </a:r>
+          </a:p>
+        </p:txBody>
+      </p:sp>
     </p:spTree>
     <p:extLst>
       <p:ext uri="{BB962C8B-B14F-4D97-AF65-F5344CB8AC3E}">

</xml_diff>